<commit_message>
added intro and exercises
</commit_message>
<xml_diff>
--- a/doc/slides/day4/session3/RunningWorkflows.pptx
+++ b/doc/slides/day4/session3/RunningWorkflows.pptx
@@ -5,14 +5,15 @@
     <p:sldMasterId id="2147483648" r:id="rId1"/>
   </p:sldMasterIdLst>
   <p:notesMasterIdLst>
-    <p:notesMasterId r:id="rId7"/>
+    <p:notesMasterId r:id="rId8"/>
   </p:notesMasterIdLst>
   <p:sldIdLst>
     <p:sldId id="256" r:id="rId2"/>
-    <p:sldId id="258" r:id="rId3"/>
-    <p:sldId id="257" r:id="rId4"/>
-    <p:sldId id="259" r:id="rId5"/>
-    <p:sldId id="260" r:id="rId6"/>
+    <p:sldId id="261" r:id="rId3"/>
+    <p:sldId id="258" r:id="rId4"/>
+    <p:sldId id="262" r:id="rId5"/>
+    <p:sldId id="259" r:id="rId6"/>
+    <p:sldId id="260" r:id="rId7"/>
   </p:sldIdLst>
   <p:sldSz cx="9144000" cy="6858000" type="screen4x3"/>
   <p:notesSz cx="6858000" cy="9144000"/>
@@ -197,7 +198,7 @@
             <a:fld id="{CA428752-E750-7D4F-BE4B-114A5D768740}" type="datetimeFigureOut">
               <a:rPr lang="en-US" smtClean="0"/>
               <a:pPr/>
-              <a:t>9/3/12</a:t>
+              <a:t>9/13/12</a:t>
             </a:fld>
             <a:endParaRPr lang="en-US"/>
           </a:p>
@@ -743,7 +744,7 @@
             <a:fld id="{2E2062EE-C02B-1E4B-8957-C75DC942CD8A}" type="datetimeFigureOut">
               <a:rPr lang="en-US" smtClean="0"/>
               <a:pPr/>
-              <a:t>9/3/12</a:t>
+              <a:t>9/13/12</a:t>
             </a:fld>
             <a:endParaRPr lang="en-US"/>
           </a:p>
@@ -910,7 +911,7 @@
             <a:fld id="{2E2062EE-C02B-1E4B-8957-C75DC942CD8A}" type="datetimeFigureOut">
               <a:rPr lang="en-US" smtClean="0"/>
               <a:pPr/>
-              <a:t>9/3/12</a:t>
+              <a:t>9/13/12</a:t>
             </a:fld>
             <a:endParaRPr lang="en-US"/>
           </a:p>
@@ -1087,7 +1088,7 @@
             <a:fld id="{2E2062EE-C02B-1E4B-8957-C75DC942CD8A}" type="datetimeFigureOut">
               <a:rPr lang="en-US" smtClean="0"/>
               <a:pPr/>
-              <a:t>9/3/12</a:t>
+              <a:t>9/13/12</a:t>
             </a:fld>
             <a:endParaRPr lang="en-US"/>
           </a:p>
@@ -1254,7 +1255,7 @@
             <a:fld id="{2E2062EE-C02B-1E4B-8957-C75DC942CD8A}" type="datetimeFigureOut">
               <a:rPr lang="en-US" smtClean="0"/>
               <a:pPr/>
-              <a:t>9/3/12</a:t>
+              <a:t>9/13/12</a:t>
             </a:fld>
             <a:endParaRPr lang="en-US"/>
           </a:p>
@@ -1497,7 +1498,7 @@
             <a:fld id="{2E2062EE-C02B-1E4B-8957-C75DC942CD8A}" type="datetimeFigureOut">
               <a:rPr lang="en-US" smtClean="0"/>
               <a:pPr/>
-              <a:t>9/3/12</a:t>
+              <a:t>9/13/12</a:t>
             </a:fld>
             <a:endParaRPr lang="en-US"/>
           </a:p>
@@ -1782,7 +1783,7 @@
             <a:fld id="{2E2062EE-C02B-1E4B-8957-C75DC942CD8A}" type="datetimeFigureOut">
               <a:rPr lang="en-US" smtClean="0"/>
               <a:pPr/>
-              <a:t>9/3/12</a:t>
+              <a:t>9/13/12</a:t>
             </a:fld>
             <a:endParaRPr lang="en-US"/>
           </a:p>
@@ -2201,7 +2202,7 @@
             <a:fld id="{2E2062EE-C02B-1E4B-8957-C75DC942CD8A}" type="datetimeFigureOut">
               <a:rPr lang="en-US" smtClean="0"/>
               <a:pPr/>
-              <a:t>9/3/12</a:t>
+              <a:t>9/13/12</a:t>
             </a:fld>
             <a:endParaRPr lang="en-US"/>
           </a:p>
@@ -2316,7 +2317,7 @@
             <a:fld id="{2E2062EE-C02B-1E4B-8957-C75DC942CD8A}" type="datetimeFigureOut">
               <a:rPr lang="en-US" smtClean="0"/>
               <a:pPr/>
-              <a:t>9/3/12</a:t>
+              <a:t>9/13/12</a:t>
             </a:fld>
             <a:endParaRPr lang="en-US"/>
           </a:p>
@@ -2408,7 +2409,7 @@
             <a:fld id="{2E2062EE-C02B-1E4B-8957-C75DC942CD8A}" type="datetimeFigureOut">
               <a:rPr lang="en-US" smtClean="0"/>
               <a:pPr/>
-              <a:t>9/3/12</a:t>
+              <a:t>9/13/12</a:t>
             </a:fld>
             <a:endParaRPr lang="en-US"/>
           </a:p>
@@ -2682,7 +2683,7 @@
             <a:fld id="{2E2062EE-C02B-1E4B-8957-C75DC942CD8A}" type="datetimeFigureOut">
               <a:rPr lang="en-US" smtClean="0"/>
               <a:pPr/>
-              <a:t>9/3/12</a:t>
+              <a:t>9/13/12</a:t>
             </a:fld>
             <a:endParaRPr lang="en-US"/>
           </a:p>
@@ -2932,7 +2933,7 @@
             <a:fld id="{2E2062EE-C02B-1E4B-8957-C75DC942CD8A}" type="datetimeFigureOut">
               <a:rPr lang="en-US" smtClean="0"/>
               <a:pPr/>
-              <a:t>9/3/12</a:t>
+              <a:t>9/13/12</a:t>
             </a:fld>
             <a:endParaRPr lang="en-US"/>
           </a:p>
@@ -3142,7 +3143,7 @@
             <a:fld id="{2E2062EE-C02B-1E4B-8957-C75DC942CD8A}" type="datetimeFigureOut">
               <a:rPr lang="en-US" smtClean="0"/>
               <a:pPr/>
-              <a:t>9/3/12</a:t>
+              <a:t>9/13/12</a:t>
             </a:fld>
             <a:endParaRPr lang="en-US"/>
           </a:p>
@@ -3564,6 +3565,13 @@
   <p:clrMapOvr>
     <a:masterClrMapping/>
   </p:clrMapOvr>
+  <p:timing>
+    <p:tnLst>
+      <p:par>
+        <p:cTn id="1" dur="indefinite" restart="never" nodeType="tmRoot"/>
+      </p:par>
+    </p:tnLst>
+  </p:timing>
 </p:sld>
 </file>
 
@@ -3601,7 +3609,7 @@
           <a:p>
             <a:r>
               <a:rPr lang="en-US" dirty="0" smtClean="0"/>
-              <a:t>Galaxy workflow sharing</a:t>
+              <a:t>Workflow sharing</a:t>
             </a:r>
             <a:endParaRPr lang="en-US" dirty="0"/>
           </a:p>
@@ -3609,28 +3617,113 @@
       </p:sp>
       <p:sp>
         <p:nvSpPr>
-          <p:cNvPr id="3" name="Content Placeholder 2"/>
-          <p:cNvSpPr>
-            <a:spLocks noGrp="1"/>
-          </p:cNvSpPr>
-          <p:nvPr>
-            <p:ph idx="1"/>
-          </p:nvPr>
-        </p:nvSpPr>
-        <p:spPr/>
-        <p:txBody>
-          <a:bodyPr/>
-          <a:lstStyle/>
-          <a:p>
-            <a:endParaRPr lang="en-US"/>
-          </a:p>
-        </p:txBody>
-      </p:sp>
+          <p:cNvPr id="4" name="Content Placeholder 3"/>
+          <p:cNvSpPr>
+            <a:spLocks noGrp="1"/>
+          </p:cNvSpPr>
+          <p:nvPr>
+            <p:ph sz="half" idx="1"/>
+          </p:nvPr>
+        </p:nvSpPr>
+        <p:spPr/>
+        <p:txBody>
+          <a:bodyPr/>
+          <a:lstStyle/>
+          <a:p>
+            <a:r>
+              <a:rPr lang="en-US" dirty="0" err="1" smtClean="0"/>
+              <a:t>myExperiment.org</a:t>
+            </a:r>
+            <a:r>
+              <a:rPr lang="en-US" dirty="0" smtClean="0"/>
+              <a:t> is a platform for sharing files and workflows for:</a:t>
+            </a:r>
+          </a:p>
+          <a:p>
+            <a:pPr lvl="1"/>
+            <a:r>
+              <a:rPr lang="en-US" dirty="0" err="1" smtClean="0"/>
+              <a:t>Taverna</a:t>
+            </a:r>
+            <a:endParaRPr lang="en-US" dirty="0" smtClean="0"/>
+          </a:p>
+          <a:p>
+            <a:pPr lvl="1"/>
+            <a:r>
+              <a:rPr lang="en-US" dirty="0" err="1" smtClean="0"/>
+              <a:t>RapidMiner</a:t>
+            </a:r>
+            <a:endParaRPr lang="en-US" dirty="0" smtClean="0"/>
+          </a:p>
+          <a:p>
+            <a:pPr lvl="1"/>
+            <a:r>
+              <a:rPr lang="en-US" dirty="0" err="1" smtClean="0"/>
+              <a:t>Kepler</a:t>
+            </a:r>
+            <a:endParaRPr lang="en-US" dirty="0" smtClean="0"/>
+          </a:p>
+          <a:p>
+            <a:pPr lvl="1"/>
+            <a:r>
+              <a:rPr lang="en-US" dirty="0" err="1" smtClean="0"/>
+              <a:t>BioClipse</a:t>
+            </a:r>
+            <a:endParaRPr lang="en-US" dirty="0" smtClean="0"/>
+          </a:p>
+          <a:p>
+            <a:pPr lvl="1"/>
+            <a:r>
+              <a:rPr lang="en-US" dirty="0" smtClean="0"/>
+              <a:t>etc.</a:t>
+            </a:r>
+            <a:endParaRPr lang="en-US" dirty="0"/>
+          </a:p>
+        </p:txBody>
+      </p:sp>
+      <p:pic>
+        <p:nvPicPr>
+          <p:cNvPr id="6" name="Content Placeholder 5" descr="myexperiment.png"/>
+          <p:cNvPicPr>
+            <a:picLocks noGrp="1" noChangeAspect="1"/>
+          </p:cNvPicPr>
+          <p:nvPr>
+            <p:ph sz="half" idx="2"/>
+          </p:nvPr>
+        </p:nvPicPr>
+        <p:blipFill>
+          <a:blip r:embed="rId2"/>
+          <a:srcRect/>
+          <a:stretch>
+            <a:fillRect/>
+          </a:stretch>
+        </p:blipFill>
+        <p:spPr>
+          <a:xfrm>
+            <a:off x="4648200" y="1776480"/>
+            <a:ext cx="4038600" cy="3252720"/>
+          </a:xfrm>
+          <a:effectLst>
+            <a:outerShdw blurRad="50800" dist="38100" dir="2700000" algn="tl" rotWithShape="0">
+              <a:srgbClr val="000000">
+                <a:alpha val="43000"/>
+              </a:srgbClr>
+            </a:outerShdw>
+          </a:effectLst>
+        </p:spPr>
+      </p:pic>
     </p:spTree>
   </p:cSld>
   <p:clrMapOvr>
     <a:masterClrMapping/>
   </p:clrMapOvr>
+  <p:timing>
+    <p:tnLst>
+      <p:par>
+        <p:cTn id="1" dur="indefinite" restart="never" nodeType="tmRoot"/>
+      </p:par>
+    </p:tnLst>
+  </p:timing>
 </p:sld>
 </file>
 
@@ -3667,8 +3760,8 @@
           <a:lstStyle/>
           <a:p>
             <a:r>
-              <a:rPr lang="en-US" dirty="0" err="1" smtClean="0"/>
-              <a:t>myExperiment</a:t>
+              <a:rPr lang="en-US" dirty="0" smtClean="0"/>
+              <a:t>Galaxy workflow sharing</a:t>
             </a:r>
             <a:endParaRPr lang="en-US" dirty="0"/>
           </a:p>
@@ -3676,28 +3769,89 @@
       </p:sp>
       <p:sp>
         <p:nvSpPr>
-          <p:cNvPr id="3" name="Content Placeholder 2"/>
-          <p:cNvSpPr>
-            <a:spLocks noGrp="1"/>
-          </p:cNvSpPr>
-          <p:nvPr>
-            <p:ph idx="1"/>
-          </p:nvPr>
-        </p:nvSpPr>
-        <p:spPr/>
-        <p:txBody>
-          <a:bodyPr/>
-          <a:lstStyle/>
-          <a:p>
-            <a:endParaRPr lang="en-US"/>
-          </a:p>
-        </p:txBody>
-      </p:sp>
+          <p:cNvPr id="4" name="Content Placeholder 3"/>
+          <p:cNvSpPr>
+            <a:spLocks noGrp="1"/>
+          </p:cNvSpPr>
+          <p:nvPr>
+            <p:ph sz="half" idx="1"/>
+          </p:nvPr>
+        </p:nvSpPr>
+        <p:spPr>
+          <a:xfrm>
+            <a:off x="457200" y="1371601"/>
+            <a:ext cx="8305800" cy="1295400"/>
+          </a:xfrm>
+        </p:spPr>
+        <p:txBody>
+          <a:bodyPr>
+            <a:normAutofit/>
+          </a:bodyPr>
+          <a:lstStyle/>
+          <a:p>
+            <a:r>
+              <a:rPr lang="en-US" sz="2000" dirty="0" smtClean="0"/>
+              <a:t>Galaxy, being web-based, hosts its own platform for workflow sharing</a:t>
+            </a:r>
+          </a:p>
+          <a:p>
+            <a:r>
+              <a:rPr lang="en-US" sz="2000" dirty="0" smtClean="0"/>
+              <a:t>Any history you have built up can be turned into a workflow and shared</a:t>
+            </a:r>
+          </a:p>
+          <a:p>
+            <a:r>
+              <a:rPr lang="en-US" sz="2000" dirty="0" smtClean="0"/>
+              <a:t>The URL for this workflow can be supplementary material to a publication</a:t>
+            </a:r>
+            <a:endParaRPr lang="en-US" sz="2000" dirty="0"/>
+          </a:p>
+        </p:txBody>
+      </p:sp>
+      <p:pic>
+        <p:nvPicPr>
+          <p:cNvPr id="6" name="Content Placeholder 5" descr="galaxy_workflow_sharing.png"/>
+          <p:cNvPicPr>
+            <a:picLocks noGrp="1" noChangeAspect="1"/>
+          </p:cNvPicPr>
+          <p:nvPr>
+            <p:ph sz="half" idx="2"/>
+          </p:nvPr>
+        </p:nvPicPr>
+        <p:blipFill>
+          <a:blip r:embed="rId2"/>
+          <a:srcRect/>
+          <a:stretch>
+            <a:fillRect/>
+          </a:stretch>
+        </p:blipFill>
+        <p:spPr>
+          <a:xfrm>
+            <a:off x="1676400" y="2731718"/>
+            <a:ext cx="5791200" cy="3814811"/>
+          </a:xfrm>
+          <a:effectLst>
+            <a:outerShdw blurRad="50800" dist="38100" dir="2700000" algn="tl" rotWithShape="0">
+              <a:srgbClr val="000000">
+                <a:alpha val="43000"/>
+              </a:srgbClr>
+            </a:outerShdw>
+          </a:effectLst>
+        </p:spPr>
+      </p:pic>
     </p:spTree>
   </p:cSld>
   <p:clrMapOvr>
     <a:masterClrMapping/>
   </p:clrMapOvr>
+  <p:timing>
+    <p:tnLst>
+      <p:par>
+        <p:cTn id="1" dur="indefinite" restart="never" nodeType="tmRoot"/>
+      </p:par>
+    </p:tnLst>
+  </p:timing>
 </p:sld>
 </file>
 
@@ -3720,7 +3874,7 @@
       </p:grpSpPr>
       <p:sp>
         <p:nvSpPr>
-          <p:cNvPr id="2" name="Title 1"/>
+          <p:cNvPr id="5" name="Title 4"/>
           <p:cNvSpPr>
             <a:spLocks noGrp="1"/>
           </p:cNvSpPr>
@@ -3751,30 +3905,37 @@
           </a:p>
         </p:txBody>
       </p:sp>
-      <p:sp>
-        <p:nvSpPr>
-          <p:cNvPr id="3" name="Content Placeholder 2"/>
-          <p:cNvSpPr>
-            <a:spLocks noGrp="1"/>
-          </p:cNvSpPr>
+      <p:pic>
+        <p:nvPicPr>
+          <p:cNvPr id="7" name="Content Placeholder 6" descr="windshield_route.jpeg"/>
+          <p:cNvPicPr>
+            <a:picLocks noGrp="1" noChangeAspect="1"/>
+          </p:cNvPicPr>
           <p:nvPr>
             <p:ph idx="1"/>
           </p:nvPr>
-        </p:nvSpPr>
-        <p:spPr/>
-        <p:txBody>
-          <a:bodyPr/>
-          <a:lstStyle/>
-          <a:p>
-            <a:endParaRPr lang="en-US"/>
-          </a:p>
-        </p:txBody>
-      </p:sp>
+        </p:nvPicPr>
+        <p:blipFill>
+          <a:blip r:embed="rId2"/>
+          <a:srcRect l="-1657" r="-1657"/>
+          <a:stretch>
+            <a:fillRect/>
+          </a:stretch>
+        </p:blipFill>
+        <p:spPr/>
+      </p:pic>
     </p:spTree>
   </p:cSld>
   <p:clrMapOvr>
     <a:masterClrMapping/>
   </p:clrMapOvr>
+  <p:timing>
+    <p:tnLst>
+      <p:par>
+        <p:cTn id="1" dur="indefinite" restart="never" nodeType="tmRoot"/>
+      </p:par>
+    </p:tnLst>
+  </p:timing>
 </p:sld>
 </file>
 
@@ -3807,41 +3968,290 @@
         </p:nvSpPr>
         <p:spPr/>
         <p:txBody>
-          <a:bodyPr/>
+          <a:bodyPr>
+            <a:normAutofit fontScale="90000"/>
+          </a:bodyPr>
           <a:lstStyle/>
           <a:p>
             <a:r>
               <a:rPr lang="en-US" dirty="0" smtClean="0"/>
-              <a:t>Exercise: run an existing workflow</a:t>
+              <a:t>Example: </a:t>
+            </a:r>
+            <a:r>
+              <a:rPr lang="en-US" dirty="0" err="1" smtClean="0"/>
+              <a:t>metagenomics</a:t>
+            </a:r>
+            <a:r>
+              <a:rPr lang="en-US" dirty="0" smtClean="0"/>
+              <a:t> on windshield</a:t>
             </a:r>
             <a:endParaRPr lang="en-US" dirty="0"/>
           </a:p>
         </p:txBody>
       </p:sp>
-      <p:sp>
-        <p:nvSpPr>
-          <p:cNvPr id="3" name="Content Placeholder 2"/>
-          <p:cNvSpPr>
-            <a:spLocks noGrp="1"/>
-          </p:cNvSpPr>
-          <p:nvPr>
-            <p:ph idx="1"/>
-          </p:nvPr>
-        </p:nvSpPr>
-        <p:spPr/>
-        <p:txBody>
-          <a:bodyPr/>
-          <a:lstStyle/>
-          <a:p>
-            <a:endParaRPr lang="en-US"/>
-          </a:p>
-        </p:txBody>
-      </p:sp>
+      <p:pic>
+        <p:nvPicPr>
+          <p:cNvPr id="8" name="Content Placeholder 7" descr="windshield_phylogenies.jpeg"/>
+          <p:cNvPicPr>
+            <a:picLocks noGrp="1" noChangeAspect="1"/>
+          </p:cNvPicPr>
+          <p:nvPr>
+            <p:ph sz="half" idx="1"/>
+          </p:nvPr>
+        </p:nvPicPr>
+        <p:blipFill>
+          <a:blip r:embed="rId2"/>
+          <a:srcRect l="-15865" r="-15865"/>
+          <a:stretch>
+            <a:fillRect/>
+          </a:stretch>
+        </p:blipFill>
+        <p:spPr/>
+      </p:pic>
+      <p:pic>
+        <p:nvPicPr>
+          <p:cNvPr id="6" name="Content Placeholder 5" descr="windshield.png"/>
+          <p:cNvPicPr>
+            <a:picLocks noGrp="1" noChangeAspect="1"/>
+          </p:cNvPicPr>
+          <p:nvPr>
+            <p:ph sz="half" idx="2"/>
+          </p:nvPr>
+        </p:nvPicPr>
+        <p:blipFill>
+          <a:blip r:embed="rId3"/>
+          <a:srcRect l="3609" t="1895" r="4813" b="1895"/>
+          <a:stretch>
+            <a:fillRect/>
+          </a:stretch>
+        </p:blipFill>
+        <p:spPr>
+          <a:xfrm>
+            <a:off x="5014208" y="1685976"/>
+            <a:ext cx="3263690" cy="4354411"/>
+          </a:xfrm>
+          <a:ln>
+            <a:solidFill>
+              <a:schemeClr val="bg1">
+                <a:lumMod val="75000"/>
+              </a:schemeClr>
+            </a:solidFill>
+          </a:ln>
+          <a:effectLst>
+            <a:outerShdw blurRad="50800" dist="38100" dir="2700000" algn="tl" rotWithShape="0">
+              <a:srgbClr val="000000">
+                <a:alpha val="43000"/>
+              </a:srgbClr>
+            </a:outerShdw>
+          </a:effectLst>
+        </p:spPr>
+      </p:pic>
     </p:spTree>
   </p:cSld>
   <p:clrMapOvr>
     <a:masterClrMapping/>
   </p:clrMapOvr>
+  <p:timing>
+    <p:tnLst>
+      <p:par>
+        <p:cTn id="1" dur="indefinite" restart="never" nodeType="tmRoot"/>
+      </p:par>
+    </p:tnLst>
+  </p:timing>
+</p:sld>
+</file>
+
+<file path=ppt/slides/slide6.xml><?xml version="1.0" encoding="utf-8"?>
+<p:sld xmlns:a="http://schemas.openxmlformats.org/drawingml/2006/main" xmlns:r="http://schemas.openxmlformats.org/officeDocument/2006/relationships" xmlns:mc="http://schemas.openxmlformats.org/markup-compatibility/2006" xmlns:mv="urn:schemas-microsoft-com:mac:vml" xmlns:p="http://schemas.openxmlformats.org/presentationml/2006/main" mc:Ignorable="mv" mc:PreserveAttributes="mv:*">
+  <p:cSld>
+    <p:spTree>
+      <p:nvGrpSpPr>
+        <p:cNvPr id="1" name=""/>
+        <p:cNvGrpSpPr/>
+        <p:nvPr/>
+      </p:nvGrpSpPr>
+      <p:grpSpPr>
+        <a:xfrm>
+          <a:off x="0" y="0"/>
+          <a:ext cx="0" cy="0"/>
+          <a:chOff x="0" y="0"/>
+          <a:chExt cx="0" cy="0"/>
+        </a:xfrm>
+      </p:grpSpPr>
+      <p:sp>
+        <p:nvSpPr>
+          <p:cNvPr id="2" name="Title 1"/>
+          <p:cNvSpPr>
+            <a:spLocks noGrp="1"/>
+          </p:cNvSpPr>
+          <p:nvPr>
+            <p:ph type="title"/>
+          </p:nvPr>
+        </p:nvSpPr>
+        <p:spPr/>
+        <p:txBody>
+          <a:bodyPr/>
+          <a:lstStyle/>
+          <a:p>
+            <a:r>
+              <a:rPr lang="en-US" dirty="0" smtClean="0"/>
+              <a:t>Exercise: run an existing workflow</a:t>
+            </a:r>
+            <a:endParaRPr lang="en-US" dirty="0"/>
+          </a:p>
+        </p:txBody>
+      </p:sp>
+      <p:sp>
+        <p:nvSpPr>
+          <p:cNvPr id="3" name="Content Placeholder 2"/>
+          <p:cNvSpPr>
+            <a:spLocks noGrp="1"/>
+          </p:cNvSpPr>
+          <p:nvPr>
+            <p:ph idx="1"/>
+          </p:nvPr>
+        </p:nvSpPr>
+        <p:spPr/>
+        <p:txBody>
+          <a:bodyPr>
+            <a:normAutofit fontScale="77500" lnSpcReduction="20000"/>
+          </a:bodyPr>
+          <a:lstStyle/>
+          <a:p>
+            <a:r>
+              <a:rPr lang="en-US" dirty="0" smtClean="0"/>
+              <a:t>Log in on Galaxy "main"</a:t>
+            </a:r>
+          </a:p>
+          <a:p>
+            <a:r>
+              <a:rPr lang="en-US" dirty="0" smtClean="0"/>
+              <a:t>Go </a:t>
+            </a:r>
+            <a:r>
+              <a:rPr lang="en-US" dirty="0" smtClean="0"/>
+              <a:t>to </a:t>
+            </a:r>
+            <a:r>
+              <a:rPr lang="en-US" dirty="0" smtClean="0">
+                <a:solidFill>
+                  <a:srgbClr val="0000FF"/>
+                </a:solidFill>
+              </a:rPr>
+              <a:t>https://main.g2.bx.psu.edu/u/aun1/p/windshield-</a:t>
+            </a:r>
+            <a:r>
+              <a:rPr lang="en-US" dirty="0" smtClean="0">
+                <a:solidFill>
+                  <a:srgbClr val="0000FF"/>
+                </a:solidFill>
+              </a:rPr>
+              <a:t>splatter</a:t>
+            </a:r>
+          </a:p>
+          <a:p>
+            <a:r>
+              <a:rPr lang="en-US" dirty="0" smtClean="0"/>
+              <a:t>Import 'Galaxy history | </a:t>
+            </a:r>
+            <a:r>
+              <a:rPr lang="en-US" dirty="0" err="1" smtClean="0"/>
+              <a:t>metagenomic</a:t>
+            </a:r>
+            <a:r>
+              <a:rPr lang="en-US" dirty="0" smtClean="0"/>
+              <a:t> analysis'</a:t>
+            </a:r>
+          </a:p>
+          <a:p>
+            <a:r>
+              <a:rPr lang="en-US" dirty="0" smtClean="0"/>
+              <a:t>Analyze the steps of the workflow:</a:t>
+            </a:r>
+          </a:p>
+          <a:p>
+            <a:pPr lvl="1"/>
+            <a:r>
+              <a:rPr lang="en-US" dirty="0" smtClean="0"/>
+              <a:t>What was the minimal </a:t>
+            </a:r>
+            <a:r>
+              <a:rPr lang="en-US" dirty="0" err="1" smtClean="0"/>
+              <a:t>phred</a:t>
+            </a:r>
+            <a:r>
+              <a:rPr lang="en-US" dirty="0" smtClean="0"/>
+              <a:t> score we accept in step 2?</a:t>
+            </a:r>
+          </a:p>
+          <a:p>
+            <a:pPr lvl="1"/>
+            <a:r>
+              <a:rPr lang="en-US" dirty="0" smtClean="0"/>
+              <a:t>Why would splitting on "low quality based in </a:t>
+            </a:r>
+            <a:r>
+              <a:rPr lang="en-US" dirty="0" err="1" smtClean="0"/>
+              <a:t>homopolymers</a:t>
+            </a:r>
+            <a:r>
+              <a:rPr lang="en-US" dirty="0" smtClean="0"/>
+              <a:t>" result in fragmentation in 454 runs?</a:t>
+            </a:r>
+          </a:p>
+          <a:p>
+            <a:pPr lvl="1"/>
+            <a:r>
+              <a:rPr lang="en-US" dirty="0" smtClean="0"/>
+              <a:t>Why was </a:t>
+            </a:r>
+            <a:r>
+              <a:rPr lang="en-US" dirty="0" err="1" smtClean="0"/>
+              <a:t>megablast</a:t>
+            </a:r>
+            <a:r>
+              <a:rPr lang="en-US" dirty="0" smtClean="0"/>
+              <a:t> run twice?</a:t>
+            </a:r>
+            <a:endParaRPr lang="en-US" dirty="0" smtClean="0"/>
+          </a:p>
+          <a:p>
+            <a:pPr lvl="1"/>
+            <a:r>
+              <a:rPr lang="en-US" dirty="0" smtClean="0"/>
+              <a:t>What is a "join" (in step 11)?</a:t>
+            </a:r>
+          </a:p>
+          <a:p>
+            <a:pPr lvl="1"/>
+            <a:r>
+              <a:rPr lang="en-US" dirty="0" smtClean="0"/>
+              <a:t>What do we filter on in step 12?</a:t>
+            </a:r>
+            <a:endParaRPr lang="en-US" dirty="0" smtClean="0"/>
+          </a:p>
+          <a:p>
+            <a:pPr lvl="1"/>
+            <a:r>
+              <a:rPr lang="en-US" dirty="0" smtClean="0"/>
+              <a:t>Based on step 16, is windshield splatter actually mostly insects?</a:t>
+            </a:r>
+            <a:endParaRPr lang="en-US" dirty="0"/>
+          </a:p>
+        </p:txBody>
+      </p:sp>
+    </p:spTree>
+  </p:cSld>
+  <p:clrMapOvr>
+    <a:masterClrMapping/>
+  </p:clrMapOvr>
+  <p:timing>
+    <p:tnLst>
+      <p:par>
+        <p:cTn id="1" dur="indefinite" restart="never" nodeType="tmRoot"/>
+      </p:par>
+    </p:tnLst>
+  </p:timing>
 </p:sld>
 </file>
 

</xml_diff>